<commit_message>
added income slide to presentation
</commit_message>
<xml_diff>
--- a/Presentation Project1 - Los Angeles Crime Statistics.pptx
+++ b/Presentation Project1 - Los Angeles Crime Statistics.pptx
@@ -5,7 +5,7 @@
     <p:sldMasterId id="2147483648" r:id="rId1"/>
   </p:sldMasterIdLst>
   <p:notesMasterIdLst>
-    <p:notesMasterId r:id="rId14"/>
+    <p:notesMasterId r:id="rId15"/>
   </p:notesMasterIdLst>
   <p:sldIdLst>
     <p:sldId id="256" r:id="rId2"/>
@@ -20,6 +20,7 @@
     <p:sldId id="266" r:id="rId11"/>
     <p:sldId id="263" r:id="rId12"/>
     <p:sldId id="264" r:id="rId13"/>
+    <p:sldId id="268" r:id="rId14"/>
   </p:sldIdLst>
   <p:sldSz cx="12192000" cy="6858000"/>
   <p:notesSz cx="6858000" cy="9144000"/>
@@ -4005,6 +4006,171 @@
     <p:extLst>
       <p:ext uri="{BB962C8B-B14F-4D97-AF65-F5344CB8AC3E}">
         <p14:creationId xmlns:p14="http://schemas.microsoft.com/office/powerpoint/2010/main" val="3014659041"/>
+      </p:ext>
+    </p:extLst>
+  </p:cSld>
+  <p:clrMapOvr>
+    <a:masterClrMapping/>
+  </p:clrMapOvr>
+</p:sld>
+</file>
+
+<file path=ppt/slides/slide13.xml><?xml version="1.0" encoding="utf-8"?>
+<p:sld xmlns:a="http://schemas.openxmlformats.org/drawingml/2006/main" xmlns:r="http://schemas.openxmlformats.org/officeDocument/2006/relationships" xmlns:p="http://schemas.openxmlformats.org/presentationml/2006/main">
+  <p:cSld>
+    <p:spTree>
+      <p:nvGrpSpPr>
+        <p:cNvPr id="1" name=""/>
+        <p:cNvGrpSpPr/>
+        <p:nvPr/>
+      </p:nvGrpSpPr>
+      <p:grpSpPr>
+        <a:xfrm>
+          <a:off x="0" y="0"/>
+          <a:ext cx="0" cy="0"/>
+          <a:chOff x="0" y="0"/>
+          <a:chExt cx="0" cy="0"/>
+        </a:xfrm>
+      </p:grpSpPr>
+      <p:sp>
+        <p:nvSpPr>
+          <p:cNvPr id="2" name="Title 1">
+            <a:extLst>
+              <a:ext uri="{FF2B5EF4-FFF2-40B4-BE49-F238E27FC236}">
+                <a16:creationId xmlns:a16="http://schemas.microsoft.com/office/drawing/2014/main" id="{E9915F18-E107-4392-B635-0760B449D650}"/>
+              </a:ext>
+            </a:extLst>
+          </p:cNvPr>
+          <p:cNvSpPr>
+            <a:spLocks noGrp="1"/>
+          </p:cNvSpPr>
+          <p:nvPr>
+            <p:ph type="title"/>
+          </p:nvPr>
+        </p:nvSpPr>
+        <p:spPr/>
+        <p:txBody>
+          <a:bodyPr/>
+          <a:lstStyle/>
+          <a:p>
+            <a:r>
+              <a:rPr lang="en-US" dirty="0"/>
+              <a:t>Effects of Median Income on Crime Rates</a:t>
+            </a:r>
+          </a:p>
+        </p:txBody>
+      </p:sp>
+      <p:pic>
+        <p:nvPicPr>
+          <p:cNvPr id="5" name="Content Placeholder 4">
+            <a:extLst>
+              <a:ext uri="{FF2B5EF4-FFF2-40B4-BE49-F238E27FC236}">
+                <a16:creationId xmlns:a16="http://schemas.microsoft.com/office/drawing/2014/main" id="{7E12DE93-BB87-42FF-9B0A-D2D275E326A0}"/>
+              </a:ext>
+            </a:extLst>
+          </p:cNvPr>
+          <p:cNvPicPr>
+            <a:picLocks noGrp="1" noChangeAspect="1"/>
+          </p:cNvPicPr>
+          <p:nvPr>
+            <p:ph idx="1"/>
+          </p:nvPr>
+        </p:nvPicPr>
+        <p:blipFill>
+          <a:blip r:embed="rId2">
+            <a:extLst>
+              <a:ext uri="{28A0092B-C50C-407E-A947-70E740481C1C}">
+                <a14:useLocalDpi xmlns:a14="http://schemas.microsoft.com/office/drawing/2010/main" val="0"/>
+              </a:ext>
+            </a:extLst>
+          </a:blip>
+          <a:stretch>
+            <a:fillRect/>
+          </a:stretch>
+        </p:blipFill>
+        <p:spPr>
+          <a:xfrm>
+            <a:off x="500785" y="1690688"/>
+            <a:ext cx="6637282" cy="4259748"/>
+          </a:xfrm>
+        </p:spPr>
+      </p:pic>
+      <p:pic>
+        <p:nvPicPr>
+          <p:cNvPr id="7" name="Picture 6">
+            <a:extLst>
+              <a:ext uri="{FF2B5EF4-FFF2-40B4-BE49-F238E27FC236}">
+                <a16:creationId xmlns:a16="http://schemas.microsoft.com/office/drawing/2014/main" id="{BC69BDDF-83E5-4D13-829E-25C4354881E0}"/>
+              </a:ext>
+            </a:extLst>
+          </p:cNvPr>
+          <p:cNvPicPr>
+            <a:picLocks noChangeAspect="1"/>
+          </p:cNvPicPr>
+          <p:nvPr/>
+        </p:nvPicPr>
+        <p:blipFill>
+          <a:blip r:embed="rId3">
+            <a:extLst>
+              <a:ext uri="{28A0092B-C50C-407E-A947-70E740481C1C}">
+                <a14:useLocalDpi xmlns:a14="http://schemas.microsoft.com/office/drawing/2010/main" val="0"/>
+              </a:ext>
+            </a:extLst>
+          </a:blip>
+          <a:stretch>
+            <a:fillRect/>
+          </a:stretch>
+        </p:blipFill>
+        <p:spPr>
+          <a:xfrm>
+            <a:off x="7547510" y="1481222"/>
+            <a:ext cx="3550920" cy="2339340"/>
+          </a:xfrm>
+          <a:prstGeom prst="rect">
+            <a:avLst/>
+          </a:prstGeom>
+        </p:spPr>
+      </p:pic>
+      <p:pic>
+        <p:nvPicPr>
+          <p:cNvPr id="9" name="Picture 8">
+            <a:extLst>
+              <a:ext uri="{FF2B5EF4-FFF2-40B4-BE49-F238E27FC236}">
+                <a16:creationId xmlns:a16="http://schemas.microsoft.com/office/drawing/2014/main" id="{59A37A17-992A-4CD4-86DF-111F556C3F43}"/>
+              </a:ext>
+            </a:extLst>
+          </p:cNvPr>
+          <p:cNvPicPr>
+            <a:picLocks noChangeAspect="1"/>
+          </p:cNvPicPr>
+          <p:nvPr/>
+        </p:nvPicPr>
+        <p:blipFill>
+          <a:blip r:embed="rId4">
+            <a:extLst>
+              <a:ext uri="{28A0092B-C50C-407E-A947-70E740481C1C}">
+                <a14:useLocalDpi xmlns:a14="http://schemas.microsoft.com/office/drawing/2010/main" val="0"/>
+              </a:ext>
+            </a:extLst>
+          </a:blip>
+          <a:stretch>
+            <a:fillRect/>
+          </a:stretch>
+        </p:blipFill>
+        <p:spPr>
+          <a:xfrm>
+            <a:off x="7547510" y="4107815"/>
+            <a:ext cx="3672840" cy="2385060"/>
+          </a:xfrm>
+          <a:prstGeom prst="rect">
+            <a:avLst/>
+          </a:prstGeom>
+        </p:spPr>
+      </p:pic>
+    </p:spTree>
+    <p:extLst>
+      <p:ext uri="{BB962C8B-B14F-4D97-AF65-F5344CB8AC3E}">
+        <p14:creationId xmlns:p14="http://schemas.microsoft.com/office/powerpoint/2010/main" val="4002664754"/>
       </p:ext>
     </p:extLst>
   </p:cSld>

</xml_diff>

<commit_message>
on going updates to clean up code
</commit_message>
<xml_diff>
--- a/Presentation Project1 - Los Angeles Crime Statistics.pptx
+++ b/Presentation Project1 - Los Angeles Crime Statistics.pptx
@@ -209,7 +209,7 @@
           <a:p>
             <a:fld id="{35DA68C4-F8BF-43E3-8330-6C18CC5931C6}" type="datetimeFigureOut">
               <a:rPr lang="en-US" smtClean="0"/>
-              <a:t>3/28/2019</a:t>
+              <a:t>3/29/2019</a:t>
             </a:fld>
             <a:endParaRPr lang="en-US"/>
           </a:p>
@@ -774,7 +774,7 @@
           <a:p>
             <a:fld id="{6ADD931D-199D-4775-8AFB-7A6102A10C14}" type="datetimeFigureOut">
               <a:rPr lang="en-US" smtClean="0"/>
-              <a:t>3/28/2019</a:t>
+              <a:t>3/29/2019</a:t>
             </a:fld>
             <a:endParaRPr lang="en-US"/>
           </a:p>
@@ -942,7 +942,7 @@
           <a:p>
             <a:fld id="{6ADD931D-199D-4775-8AFB-7A6102A10C14}" type="datetimeFigureOut">
               <a:rPr lang="en-US" smtClean="0"/>
-              <a:t>3/28/2019</a:t>
+              <a:t>3/29/2019</a:t>
             </a:fld>
             <a:endParaRPr lang="en-US"/>
           </a:p>
@@ -1120,7 +1120,7 @@
           <a:p>
             <a:fld id="{6ADD931D-199D-4775-8AFB-7A6102A10C14}" type="datetimeFigureOut">
               <a:rPr lang="en-US" smtClean="0"/>
-              <a:t>3/28/2019</a:t>
+              <a:t>3/29/2019</a:t>
             </a:fld>
             <a:endParaRPr lang="en-US"/>
           </a:p>
@@ -1296,7 +1296,7 @@
           <a:p>
             <a:fld id="{6ADD931D-199D-4775-8AFB-7A6102A10C14}" type="datetimeFigureOut">
               <a:rPr lang="en-US" smtClean="0"/>
-              <a:t>3/28/2019</a:t>
+              <a:t>3/29/2019</a:t>
             </a:fld>
             <a:endParaRPr lang="en-US"/>
           </a:p>
@@ -1541,7 +1541,7 @@
           <a:p>
             <a:fld id="{6ADD931D-199D-4775-8AFB-7A6102A10C14}" type="datetimeFigureOut">
               <a:rPr lang="en-US" smtClean="0"/>
-              <a:t>3/28/2019</a:t>
+              <a:t>3/29/2019</a:t>
             </a:fld>
             <a:endParaRPr lang="en-US"/>
           </a:p>
@@ -1778,7 +1778,7 @@
           <a:p>
             <a:fld id="{6ADD931D-199D-4775-8AFB-7A6102A10C14}" type="datetimeFigureOut">
               <a:rPr lang="en-US" smtClean="0"/>
-              <a:t>3/28/2019</a:t>
+              <a:t>3/29/2019</a:t>
             </a:fld>
             <a:endParaRPr lang="en-US"/>
           </a:p>
@@ -2142,7 +2142,7 @@
           <a:p>
             <a:fld id="{6ADD931D-199D-4775-8AFB-7A6102A10C14}" type="datetimeFigureOut">
               <a:rPr lang="en-US" smtClean="0"/>
-              <a:t>3/28/2019</a:t>
+              <a:t>3/29/2019</a:t>
             </a:fld>
             <a:endParaRPr lang="en-US"/>
           </a:p>
@@ -2259,7 +2259,7 @@
           <a:p>
             <a:fld id="{6ADD931D-199D-4775-8AFB-7A6102A10C14}" type="datetimeFigureOut">
               <a:rPr lang="en-US" smtClean="0"/>
-              <a:t>3/28/2019</a:t>
+              <a:t>3/29/2019</a:t>
             </a:fld>
             <a:endParaRPr lang="en-US"/>
           </a:p>
@@ -2354,7 +2354,7 @@
           <a:p>
             <a:fld id="{6ADD931D-199D-4775-8AFB-7A6102A10C14}" type="datetimeFigureOut">
               <a:rPr lang="en-US" smtClean="0"/>
-              <a:t>3/28/2019</a:t>
+              <a:t>3/29/2019</a:t>
             </a:fld>
             <a:endParaRPr lang="en-US"/>
           </a:p>
@@ -2629,7 +2629,7 @@
           <a:p>
             <a:fld id="{6ADD931D-199D-4775-8AFB-7A6102A10C14}" type="datetimeFigureOut">
               <a:rPr lang="en-US" smtClean="0"/>
-              <a:t>3/28/2019</a:t>
+              <a:t>3/29/2019</a:t>
             </a:fld>
             <a:endParaRPr lang="en-US"/>
           </a:p>
@@ -2881,7 +2881,7 @@
           <a:p>
             <a:fld id="{6ADD931D-199D-4775-8AFB-7A6102A10C14}" type="datetimeFigureOut">
               <a:rPr lang="en-US" smtClean="0"/>
-              <a:t>3/28/2019</a:t>
+              <a:t>3/29/2019</a:t>
             </a:fld>
             <a:endParaRPr lang="en-US"/>
           </a:p>
@@ -3092,7 +3092,7 @@
           <a:p>
             <a:fld id="{6ADD931D-199D-4775-8AFB-7A6102A10C14}" type="datetimeFigureOut">
               <a:rPr lang="en-US" smtClean="0"/>
-              <a:t>3/28/2019</a:t>
+              <a:t>3/29/2019</a:t>
             </a:fld>
             <a:endParaRPr lang="en-US"/>
           </a:p>
@@ -3733,27 +3733,7 @@
           <a:p>
             <a:r>
               <a:rPr lang="en-US" dirty="0"/>
-              <a:t>Is </a:t>
-            </a:r>
-            <a:r>
-              <a:rPr lang="en-US" dirty="0"/>
-              <a:t>I</a:t>
-            </a:r>
-            <a:r>
-              <a:rPr lang="en-US" dirty="0" smtClean="0"/>
-              <a:t>t Safe </a:t>
-            </a:r>
-            <a:r>
-              <a:rPr lang="en-US" dirty="0"/>
-              <a:t>to </a:t>
-            </a:r>
-            <a:r>
-              <a:rPr lang="en-US" dirty="0" smtClean="0"/>
-              <a:t>Live </a:t>
-            </a:r>
-            <a:r>
-              <a:rPr lang="en-US" dirty="0"/>
-              <a:t>in Los Angeles?</a:t>
+              <a:t>Is It Safe to Live in Los Angeles?</a:t>
             </a:r>
           </a:p>
         </p:txBody>
@@ -3946,13 +3926,8 @@
             </a:br>
             <a:r>
               <a:rPr lang="en-US" dirty="0"/>
-              <a:t>Other </a:t>
-            </a:r>
-            <a:r>
-              <a:rPr lang="en-US" dirty="0" smtClean="0"/>
-              <a:t>Views</a:t>
-            </a:r>
-            <a:endParaRPr lang="en-US" dirty="0"/>
+              <a:t>Other Views</a:t>
+            </a:r>
           </a:p>
         </p:txBody>
       </p:sp>
@@ -5265,7 +5240,12 @@
             <p:ph type="title"/>
           </p:nvPr>
         </p:nvSpPr>
-        <p:spPr/>
+        <p:spPr>
+          <a:xfrm>
+            <a:off x="739724" y="365125"/>
+            <a:ext cx="10515600" cy="1325563"/>
+          </a:xfrm>
+        </p:spPr>
         <p:txBody>
           <a:bodyPr/>
           <a:lstStyle/>
@@ -5331,11 +5311,50 @@
         </p:blipFill>
         <p:spPr>
           <a:xfrm>
-            <a:off x="383458" y="2167731"/>
+            <a:off x="383458" y="2913318"/>
             <a:ext cx="7211961" cy="3667125"/>
           </a:xfrm>
         </p:spPr>
       </p:pic>
+      <p:sp>
+        <p:nvSpPr>
+          <p:cNvPr id="3" name="TextBox 2">
+            <a:extLst>
+              <a:ext uri="{FF2B5EF4-FFF2-40B4-BE49-F238E27FC236}">
+                <a16:creationId xmlns:a16="http://schemas.microsoft.com/office/drawing/2014/main" id="{2F02C409-058E-4C43-9653-FE08A9BFC5DE}"/>
+              </a:ext>
+            </a:extLst>
+          </p:cNvPr>
+          <p:cNvSpPr txBox="1"/>
+          <p:nvPr/>
+        </p:nvSpPr>
+        <p:spPr>
+          <a:xfrm>
+            <a:off x="838200" y="1969477"/>
+            <a:ext cx="4971757" cy="461665"/>
+          </a:xfrm>
+          <a:prstGeom prst="rect">
+            <a:avLst/>
+          </a:prstGeom>
+          <a:noFill/>
+        </p:spPr>
+        <p:txBody>
+          <a:bodyPr wrap="square" rtlCol="0">
+            <a:spAutoFit/>
+          </a:bodyPr>
+          <a:lstStyle/>
+          <a:p>
+            <a:r>
+              <a:rPr lang="en-US" sz="2400" dirty="0">
+                <a:solidFill>
+                  <a:srgbClr val="FF0000"/>
+                </a:solidFill>
+              </a:rPr>
+              <a:t>90037, 90003,  90011, 90057, 90062</a:t>
+            </a:r>
+          </a:p>
+        </p:txBody>
+      </p:sp>
     </p:spTree>
     <p:extLst>
       <p:ext uri="{BB962C8B-B14F-4D97-AF65-F5344CB8AC3E}">
@@ -5422,7 +5441,7 @@
         </p:blipFill>
         <p:spPr>
           <a:xfrm>
-            <a:off x="844579" y="1990899"/>
+            <a:off x="844579" y="2187846"/>
             <a:ext cx="2271963" cy="1514642"/>
           </a:xfrm>
           <a:prstGeom prst="rect">
@@ -5458,7 +5477,7 @@
         </p:blipFill>
         <p:spPr>
           <a:xfrm>
-            <a:off x="3549758" y="1990899"/>
+            <a:off x="3549758" y="2187846"/>
             <a:ext cx="2271963" cy="1514642"/>
           </a:xfrm>
           <a:prstGeom prst="rect">
@@ -5494,7 +5513,7 @@
         </p:blipFill>
         <p:spPr>
           <a:xfrm>
-            <a:off x="6222693" y="1990899"/>
+            <a:off x="6222693" y="2187846"/>
             <a:ext cx="2271963" cy="1514642"/>
           </a:xfrm>
           <a:prstGeom prst="rect">
@@ -5530,7 +5549,7 @@
         </p:blipFill>
         <p:spPr>
           <a:xfrm>
-            <a:off x="8895629" y="1990899"/>
+            <a:off x="8895629" y="2187846"/>
             <a:ext cx="2271963" cy="1514642"/>
           </a:xfrm>
           <a:prstGeom prst="rect">
@@ -5566,7 +5585,7 @@
         </p:blipFill>
         <p:spPr>
           <a:xfrm>
-            <a:off x="844579" y="3896135"/>
+            <a:off x="844579" y="4093082"/>
             <a:ext cx="2271963" cy="1514642"/>
           </a:xfrm>
           <a:prstGeom prst="rect">
@@ -5602,7 +5621,7 @@
         </p:blipFill>
         <p:spPr>
           <a:xfrm>
-            <a:off x="3549758" y="3896135"/>
+            <a:off x="3549758" y="4093082"/>
             <a:ext cx="2271963" cy="1514642"/>
           </a:xfrm>
           <a:prstGeom prst="rect">
@@ -5638,7 +5657,7 @@
         </p:blipFill>
         <p:spPr>
           <a:xfrm>
-            <a:off x="6222693" y="3896135"/>
+            <a:off x="6222693" y="4093082"/>
             <a:ext cx="2271963" cy="1514642"/>
           </a:xfrm>
           <a:prstGeom prst="rect">
@@ -5674,7 +5693,7 @@
         </p:blipFill>
         <p:spPr>
           <a:xfrm>
-            <a:off x="8895629" y="3896135"/>
+            <a:off x="8895629" y="4093082"/>
             <a:ext cx="2271963" cy="1514642"/>
           </a:xfrm>
           <a:prstGeom prst="rect">
@@ -5735,23 +5754,11 @@
           <a:p>
             <a:r>
               <a:rPr lang="en-US" dirty="0"/>
-              <a:t>Are </a:t>
-            </a:r>
-            <a:r>
-              <a:rPr lang="en-US" dirty="0" smtClean="0"/>
-              <a:t>Some Months/Days Safer </a:t>
-            </a:r>
-            <a:r>
-              <a:rPr lang="en-US" dirty="0"/>
-              <a:t>for Los </a:t>
-            </a:r>
-            <a:r>
-              <a:rPr lang="en-US"/>
-              <a:t>Angeles </a:t>
-            </a:r>
-            <a:r>
-              <a:rPr lang="en-US" smtClean="0"/>
-              <a:t>Residents</a:t>
+              <a:t>Are Some Months/Days Safer for Los </a:t>
+            </a:r>
+            <a:r>
+              <a:rPr lang="en-US"/>
+              <a:t>Angeles Residents</a:t>
             </a:r>
             <a:r>
               <a:rPr lang="en-US" dirty="0"/>

</xml_diff>